<commit_message>
03-02-2025 23:08 from PC 'Yevhen Kariev'
</commit_message>
<xml_diff>
--- a/Java Pro/Java Prof Program - new version.pptx
+++ b/Java Pro/Java Prof Program - new version.pptx
@@ -242,8 +242,11 @@
     </a:lvl9pPr>
   </p:defaultTextStyle>
   <p:extLst>
+    <p:ext uri="{EFAFB233-063F-42B5-8137-9DF3F51BA10A}">
+      <p15:sldGuideLst xmlns:p15="http://schemas.microsoft.com/office/powerpoint/2012/main"/>
+    </p:ext>
     <p:ext uri="http://customooxmlschemas.google.com/">
-      <go:slidesCustomData xmlns:go="http://customooxmlschemas.google.com/" xmlns:ahyp="http://schemas.microsoft.com/office/drawing/2018/hyperlinkcolor" xmlns:p15="http://schemas.microsoft.com/office/powerpoint/2012/main" xmlns:p14="http://schemas.microsoft.com/office/powerpoint/2010/main" xmlns:com="http://schemas.openxmlformats.org/drawingml/2006/compatibility" xmlns:pvml="urn:schemas-microsoft-com:office:powerpoint" xmlns:v="urn:schemas-microsoft-com:vml" xmlns:o="urn:schemas-microsoft-com:office:office" xmlns:dgm="http://schemas.openxmlformats.org/drawingml/2006/diagram" xmlns:c="http://schemas.openxmlformats.org/drawingml/2006/chart" xmlns:mv="urn:schemas-microsoft-com:mac:vml" xmlns:mc="http://schemas.openxmlformats.org/markup-compatibility/2006" xmlns="" r:id="rId6" roundtripDataSignature="AMtx7mh5ngpk3N/f7XxfAhhMRirGtz3G8w=="/>
+      <go:slidesCustomData xmlns="" xmlns:mc="http://schemas.openxmlformats.org/markup-compatibility/2006" xmlns:mv="urn:schemas-microsoft-com:mac:vml" xmlns:c="http://schemas.openxmlformats.org/drawingml/2006/chart" xmlns:dgm="http://schemas.openxmlformats.org/drawingml/2006/diagram" xmlns:o="urn:schemas-microsoft-com:office:office" xmlns:v="urn:schemas-microsoft-com:vml" xmlns:pvml="urn:schemas-microsoft-com:office:powerpoint" xmlns:com="http://schemas.openxmlformats.org/drawingml/2006/compatibility" xmlns:p14="http://schemas.microsoft.com/office/powerpoint/2010/main" xmlns:p15="http://schemas.microsoft.com/office/powerpoint/2012/main" xmlns:ahyp="http://schemas.microsoft.com/office/drawing/2018/hyperlinkcolor" xmlns:go="http://customooxmlschemas.google.com/" r:id="rId6" roundtripDataSignature="AMtx7mh5ngpk3N/f7XxfAhhMRirGtz3G8w=="/>
     </p:ext>
   </p:extLst>
 </p:presentation>
@@ -741,7 +744,7 @@
               </a:spcAft>
               <a:buNone/>
             </a:pPr>
-            <a:endParaRPr/>
+            <a:endParaRPr dirty="0"/>
           </a:p>
         </p:txBody>
       </p:sp>
@@ -13277,7 +13280,7 @@
               <a:buAutoNum type="arabicPeriod"/>
             </a:pPr>
             <a:r>
-              <a:rPr lang="en-US" sz="1200" b="1">
+              <a:rPr lang="en-US" sz="1200" b="1" dirty="0">
                 <a:latin typeface="Verdana"/>
                 <a:ea typeface="Verdana"/>
                 <a:cs typeface="Verdana"/>
@@ -13285,7 +13288,7 @@
               </a:rPr>
               <a:t>OOP (Object-Oriented Programming)	</a:t>
             </a:r>
-            <a:endParaRPr/>
+            <a:endParaRPr dirty="0"/>
           </a:p>
           <a:p>
             <a:pPr marL="800100" lvl="1" indent="-342900" algn="l" rtl="0">
@@ -13306,7 +13309,7 @@
               <a:buAutoNum type="arabicPeriod"/>
             </a:pPr>
             <a:r>
-              <a:rPr lang="en-US" sz="800" b="1">
+              <a:rPr lang="en-US" sz="800" b="1" dirty="0">
                 <a:latin typeface="Verdana"/>
                 <a:ea typeface="Verdana"/>
                 <a:cs typeface="Verdana"/>
@@ -13314,7 +13317,7 @@
               </a:rPr>
               <a:t>Classes, objects, fields and methods of an object. Fields and methods of a Class</a:t>
             </a:r>
-            <a:endParaRPr/>
+            <a:endParaRPr dirty="0"/>
           </a:p>
           <a:p>
             <a:pPr marL="800100" lvl="1" indent="-342900" algn="l" rtl="0">
@@ -13335,7 +13338,7 @@
               <a:buAutoNum type="arabicPeriod"/>
             </a:pPr>
             <a:r>
-              <a:rPr lang="en-US" sz="800" b="1">
+              <a:rPr lang="en-US" sz="800" b="1" dirty="0">
                 <a:latin typeface="Verdana"/>
                 <a:ea typeface="Verdana"/>
                 <a:cs typeface="Verdana"/>
@@ -13343,7 +13346,7 @@
               </a:rPr>
               <a:t>Encapsulation. Modifier 'static' and 'final.’ </a:t>
             </a:r>
-            <a:endParaRPr/>
+            <a:endParaRPr dirty="0"/>
           </a:p>
           <a:p>
             <a:pPr marL="800100" lvl="1" indent="-342900" algn="l" rtl="0">
@@ -13364,7 +13367,7 @@
               <a:buAutoNum type="arabicPeriod"/>
             </a:pPr>
             <a:r>
-              <a:rPr lang="en-US" sz="800" b="1">
+              <a:rPr lang="en-US" sz="800" b="1" dirty="0">
                 <a:latin typeface="Verdana"/>
                 <a:ea typeface="Verdana"/>
                 <a:cs typeface="Verdana"/>
@@ -13372,7 +13375,7 @@
               </a:rPr>
               <a:t>Inheritance. Abstract classes. </a:t>
             </a:r>
-            <a:endParaRPr/>
+            <a:endParaRPr dirty="0"/>
           </a:p>
           <a:p>
             <a:pPr marL="800100" lvl="1" indent="-342900" algn="l" rtl="0">
@@ -13393,7 +13396,7 @@
               <a:buAutoNum type="arabicPeriod"/>
             </a:pPr>
             <a:r>
-              <a:rPr lang="en-US" sz="800" b="1">
+              <a:rPr lang="en-US" sz="800" b="1" dirty="0">
                 <a:latin typeface="Verdana"/>
                 <a:ea typeface="Verdana"/>
                 <a:cs typeface="Verdana"/>
@@ -13401,7 +13404,7 @@
               </a:rPr>
               <a:t>Polymorphism. Reference Data Types in Java</a:t>
             </a:r>
-            <a:endParaRPr/>
+            <a:endParaRPr dirty="0"/>
           </a:p>
           <a:p>
             <a:pPr marL="800100" lvl="1" indent="-342900" algn="l" rtl="0">
@@ -13422,7 +13425,7 @@
               <a:buAutoNum type="arabicPeriod"/>
             </a:pPr>
             <a:r>
-              <a:rPr lang="en-US" sz="800" b="1">
+              <a:rPr lang="en-US" sz="800" b="1" dirty="0">
                 <a:latin typeface="Verdana"/>
                 <a:ea typeface="Verdana"/>
                 <a:cs typeface="Verdana"/>
@@ -13430,7 +13433,7 @@
               </a:rPr>
               <a:t>Enums in Java. Practice</a:t>
             </a:r>
-            <a:endParaRPr/>
+            <a:endParaRPr dirty="0"/>
           </a:p>
           <a:p>
             <a:pPr marL="342900" lvl="0" indent="-342900" algn="l" rtl="0">
@@ -13451,7 +13454,7 @@
               <a:buAutoNum type="arabicPeriod"/>
             </a:pPr>
             <a:r>
-              <a:rPr lang="en-US" sz="1200" b="1">
+              <a:rPr lang="en-US" sz="1200" b="1" dirty="0">
                 <a:latin typeface="Verdana"/>
                 <a:ea typeface="Verdana"/>
                 <a:cs typeface="Verdana"/>
@@ -13459,7 +13462,7 @@
               </a:rPr>
               <a:t>JCF. Java Collections Framework</a:t>
             </a:r>
-            <a:endParaRPr/>
+            <a:endParaRPr dirty="0"/>
           </a:p>
           <a:p>
             <a:pPr marL="800100" lvl="1" indent="-342900" algn="l" rtl="0">
@@ -13480,7 +13483,7 @@
               <a:buAutoNum type="arabicPeriod"/>
             </a:pPr>
             <a:r>
-              <a:rPr lang="en-US" sz="800" b="1">
+              <a:rPr lang="en-US" sz="800" b="1" dirty="0">
                 <a:latin typeface="Verdana"/>
                 <a:ea typeface="Verdana"/>
                 <a:cs typeface="Verdana"/>
@@ -13488,7 +13491,7 @@
               </a:rPr>
               <a:t>Working with Arrays in Java. Binary search. Sort.</a:t>
             </a:r>
-            <a:endParaRPr/>
+            <a:endParaRPr dirty="0"/>
           </a:p>
           <a:p>
             <a:pPr marL="800100" lvl="1" indent="-342900" algn="l" rtl="0">
@@ -13509,15 +13512,33 @@
               <a:buAutoNum type="arabicPeriod"/>
             </a:pPr>
             <a:r>
-              <a:rPr lang="en-US" sz="800" b="1">
+              <a:rPr lang="en-US" sz="800" b="1" dirty="0">
                 <a:latin typeface="Verdana"/>
                 <a:ea typeface="Verdana"/>
                 <a:cs typeface="Verdana"/>
                 <a:sym typeface="Verdana"/>
               </a:rPr>
-              <a:t>Data structures definition. Interfaces. Data structure 'List'. ArraysList implementation, beginning.</a:t>
+              <a:t>Data structures definition. Interfaces. Data structure 'List'. </a:t>
             </a:r>
-            <a:endParaRPr/>
+            <a:r>
+              <a:rPr lang="en-US" sz="800" b="1" dirty="0" err="1">
+                <a:latin typeface="Verdana"/>
+                <a:ea typeface="Verdana"/>
+                <a:cs typeface="Verdana"/>
+                <a:sym typeface="Verdana"/>
+              </a:rPr>
+              <a:t>ArraysList</a:t>
+            </a:r>
+            <a:r>
+              <a:rPr lang="en-US" sz="800" b="1" dirty="0">
+                <a:latin typeface="Verdana"/>
+                <a:ea typeface="Verdana"/>
+                <a:cs typeface="Verdana"/>
+                <a:sym typeface="Verdana"/>
+              </a:rPr>
+              <a:t> implementation, beginning.</a:t>
+            </a:r>
+            <a:endParaRPr dirty="0"/>
           </a:p>
           <a:p>
             <a:pPr marL="800100" lvl="1" indent="-342900" algn="l" rtl="0">
@@ -13538,15 +13559,33 @@
               <a:buAutoNum type="arabicPeriod"/>
             </a:pPr>
             <a:r>
-              <a:rPr lang="en-US" sz="800" b="1">
+              <a:rPr lang="en-US" sz="800" b="1" dirty="0">
                 <a:latin typeface="Verdana"/>
                 <a:ea typeface="Verdana"/>
                 <a:cs typeface="Verdana"/>
                 <a:sym typeface="Verdana"/>
               </a:rPr>
-              <a:t>Iterators and Iterable. Foreach syntax.</a:t>
+              <a:t>Iterators and </a:t>
             </a:r>
-            <a:endParaRPr/>
+            <a:r>
+              <a:rPr lang="en-US" sz="800" b="1" dirty="0" err="1">
+                <a:latin typeface="Verdana"/>
+                <a:ea typeface="Verdana"/>
+                <a:cs typeface="Verdana"/>
+                <a:sym typeface="Verdana"/>
+              </a:rPr>
+              <a:t>Iterable</a:t>
+            </a:r>
+            <a:r>
+              <a:rPr lang="en-US" sz="800" b="1" dirty="0">
+                <a:latin typeface="Verdana"/>
+                <a:ea typeface="Verdana"/>
+                <a:cs typeface="Verdana"/>
+                <a:sym typeface="Verdana"/>
+              </a:rPr>
+              <a:t>. Foreach syntax.</a:t>
+            </a:r>
+            <a:endParaRPr dirty="0"/>
           </a:p>
           <a:p>
             <a:pPr marL="800100" lvl="1" indent="-342900" algn="l" rtl="0">
@@ -13567,7 +13606,7 @@
               <a:buAutoNum type="arabicPeriod"/>
             </a:pPr>
             <a:r>
-              <a:rPr lang="en-US" sz="800" b="1">
+              <a:rPr lang="en-US" sz="800" b="1" dirty="0">
                 <a:latin typeface="Verdana"/>
                 <a:ea typeface="Verdana"/>
                 <a:cs typeface="Verdana"/>
@@ -13575,7 +13614,7 @@
               </a:rPr>
               <a:t>Lists implementations. LinkedList.</a:t>
             </a:r>
-            <a:endParaRPr/>
+            <a:endParaRPr dirty="0"/>
           </a:p>
           <a:p>
             <a:pPr marL="800100" lvl="1" indent="-342900" algn="l" rtl="0">
@@ -13596,7 +13635,7 @@
               <a:buAutoNum type="arabicPeriod"/>
             </a:pPr>
             <a:r>
-              <a:rPr lang="en-US" sz="800" b="1">
+              <a:rPr lang="en-US" sz="800" b="1" dirty="0">
                 <a:latin typeface="Verdana"/>
                 <a:ea typeface="Verdana"/>
                 <a:cs typeface="Verdana"/>
@@ -13604,7 +13643,7 @@
               </a:rPr>
               <a:t>Java Set implementation. HashSet. Exercises.</a:t>
             </a:r>
-            <a:endParaRPr/>
+            <a:endParaRPr dirty="0"/>
           </a:p>
           <a:p>
             <a:pPr marL="800100" lvl="1" indent="-342900" algn="l" rtl="0">
@@ -13625,7 +13664,7 @@
               <a:buAutoNum type="arabicPeriod"/>
             </a:pPr>
             <a:r>
-              <a:rPr lang="en-US" sz="800" b="1">
+              <a:rPr lang="en-US" sz="800" b="1" dirty="0">
                 <a:latin typeface="Verdana"/>
                 <a:ea typeface="Verdana"/>
                 <a:cs typeface="Verdana"/>
@@ -13633,7 +13672,7 @@
               </a:rPr>
               <a:t>Comparing objects in Java. Comparator, Comparable. Method sort.</a:t>
             </a:r>
-            <a:endParaRPr/>
+            <a:endParaRPr dirty="0"/>
           </a:p>
           <a:p>
             <a:pPr marL="800100" lvl="1" indent="-342900" algn="l" rtl="0">
@@ -13654,15 +13693,33 @@
               <a:buAutoNum type="arabicPeriod"/>
             </a:pPr>
             <a:r>
-              <a:rPr lang="en-US" sz="800" b="1">
+              <a:rPr lang="en-US" sz="800" b="1" dirty="0">
                 <a:latin typeface="Verdana"/>
                 <a:ea typeface="Verdana"/>
                 <a:cs typeface="Verdana"/>
                 <a:sym typeface="Verdana"/>
               </a:rPr>
-              <a:t>Data structures 'Queue', 'Stack'. Custom ArrayDeque implementation.</a:t>
+              <a:t>Data structures 'Queue', 'Stack'. Custom </a:t>
             </a:r>
-            <a:endParaRPr/>
+            <a:r>
+              <a:rPr lang="en-US" sz="800" b="1" dirty="0" err="1">
+                <a:latin typeface="Verdana"/>
+                <a:ea typeface="Verdana"/>
+                <a:cs typeface="Verdana"/>
+                <a:sym typeface="Verdana"/>
+              </a:rPr>
+              <a:t>ArrayDeque</a:t>
+            </a:r>
+            <a:r>
+              <a:rPr lang="en-US" sz="800" b="1" dirty="0">
+                <a:latin typeface="Verdana"/>
+                <a:ea typeface="Verdana"/>
+                <a:cs typeface="Verdana"/>
+                <a:sym typeface="Verdana"/>
+              </a:rPr>
+              <a:t> implementation.</a:t>
+            </a:r>
+            <a:endParaRPr dirty="0"/>
           </a:p>
           <a:p>
             <a:pPr marL="800100" lvl="1" indent="-342900" algn="l" rtl="0">
@@ -13683,15 +13740,33 @@
               <a:buAutoNum type="arabicPeriod"/>
             </a:pPr>
             <a:r>
-              <a:rPr lang="en-US" sz="800" b="1">
+              <a:rPr lang="en-US" sz="800" b="1" dirty="0">
                 <a:latin typeface="Verdana"/>
                 <a:ea typeface="Verdana"/>
                 <a:cs typeface="Verdana"/>
                 <a:sym typeface="Verdana"/>
               </a:rPr>
-              <a:t>Data structure 'Map'. Object.hashCode, HashMap implementation.</a:t>
+              <a:t>Data structure 'Map'. </a:t>
             </a:r>
-            <a:endParaRPr/>
+            <a:r>
+              <a:rPr lang="en-US" sz="800" b="1" dirty="0" err="1">
+                <a:latin typeface="Verdana"/>
+                <a:ea typeface="Verdana"/>
+                <a:cs typeface="Verdana"/>
+                <a:sym typeface="Verdana"/>
+              </a:rPr>
+              <a:t>Object.hashCode</a:t>
+            </a:r>
+            <a:r>
+              <a:rPr lang="en-US" sz="800" b="1" dirty="0">
+                <a:latin typeface="Verdana"/>
+                <a:ea typeface="Verdana"/>
+                <a:cs typeface="Verdana"/>
+                <a:sym typeface="Verdana"/>
+              </a:rPr>
+              <a:t>, HashMap implementation.</a:t>
+            </a:r>
+            <a:endParaRPr dirty="0"/>
           </a:p>
           <a:p>
             <a:pPr marL="800100" lvl="1" indent="-342900" algn="l" rtl="0">
@@ -13712,7 +13787,7 @@
               <a:buAutoNum type="arabicPeriod"/>
             </a:pPr>
             <a:r>
-              <a:rPr lang="en-US" sz="800" b="1">
+              <a:rPr lang="en-US" sz="800" b="1" dirty="0">
                 <a:latin typeface="Verdana"/>
                 <a:ea typeface="Verdana"/>
                 <a:cs typeface="Verdana"/>
@@ -13720,7 +13795,7 @@
               </a:rPr>
               <a:t>Trees, Binary Trees, Tree Map.</a:t>
             </a:r>
-            <a:endParaRPr/>
+            <a:endParaRPr dirty="0"/>
           </a:p>
           <a:p>
             <a:pPr marL="800100" lvl="1" indent="-342900" algn="l" rtl="0">
@@ -13741,7 +13816,7 @@
               <a:buAutoNum type="arabicPeriod"/>
             </a:pPr>
             <a:r>
-              <a:rPr lang="en-US" sz="800" b="1">
+              <a:rPr lang="en-US" sz="800" b="1" dirty="0">
                 <a:latin typeface="Verdana"/>
                 <a:ea typeface="Verdana"/>
                 <a:cs typeface="Verdana"/>
@@ -13749,7 +13824,7 @@
               </a:rPr>
               <a:t>Graphs. Practice.</a:t>
             </a:r>
-            <a:endParaRPr/>
+            <a:endParaRPr dirty="0"/>
           </a:p>
           <a:p>
             <a:pPr marL="457200" lvl="1" indent="0" algn="l" rtl="0">
@@ -13769,7 +13844,7 @@
               <a:buNone/>
             </a:pPr>
             <a:r>
-              <a:rPr lang="en-US" sz="800" b="1">
+              <a:rPr lang="en-US" sz="800" b="1" dirty="0">
                 <a:latin typeface="Verdana"/>
                 <a:ea typeface="Verdana"/>
                 <a:cs typeface="Verdana"/>
@@ -13777,7 +13852,7 @@
               </a:rPr>
               <a:t>test</a:t>
             </a:r>
-            <a:endParaRPr sz="1200" b="1">
+            <a:endParaRPr sz="1200" b="1" dirty="0">
               <a:latin typeface="Verdana"/>
               <a:ea typeface="Verdana"/>
               <a:cs typeface="Verdana"/>
@@ -13803,7 +13878,7 @@
               <a:buAutoNum type="arabicPeriod"/>
             </a:pPr>
             <a:r>
-              <a:rPr lang="en-US" sz="1200" b="1">
+              <a:rPr lang="en-US" sz="1200" b="1" dirty="0">
                 <a:latin typeface="Verdana"/>
                 <a:ea typeface="Verdana"/>
                 <a:cs typeface="Verdana"/>
@@ -13811,7 +13886,7 @@
               </a:rPr>
               <a:t>Lambdas &amp; Stream API</a:t>
             </a:r>
-            <a:endParaRPr/>
+            <a:endParaRPr dirty="0"/>
           </a:p>
           <a:p>
             <a:pPr marL="800100" lvl="1" indent="-342900" algn="l" rtl="0">
@@ -13832,7 +13907,7 @@
               <a:buAutoNum type="arabicPeriod"/>
             </a:pPr>
             <a:r>
-              <a:rPr lang="en-US" sz="800" b="1">
+              <a:rPr lang="en-US" sz="800" b="1" dirty="0">
                 <a:latin typeface="Verdana"/>
                 <a:ea typeface="Verdana"/>
                 <a:cs typeface="Verdana"/>
@@ -13840,7 +13915,7 @@
               </a:rPr>
               <a:t>Lambdas, Functional Interfaces, Method references.</a:t>
             </a:r>
-            <a:endParaRPr/>
+            <a:endParaRPr dirty="0"/>
           </a:p>
           <a:p>
             <a:pPr marL="800100" lvl="1" indent="-342900" algn="l" rtl="0">
@@ -13861,7 +13936,7 @@
               <a:buAutoNum type="arabicPeriod"/>
             </a:pPr>
             <a:r>
-              <a:rPr lang="en-US" sz="800" b="1">
+              <a:rPr lang="en-US" sz="800" b="1" dirty="0">
                 <a:latin typeface="Verdana"/>
                 <a:ea typeface="Verdana"/>
                 <a:cs typeface="Verdana"/>
@@ -13869,7 +13944,7 @@
               </a:rPr>
               <a:t>Practice. Functions and Supplier interfaces.</a:t>
             </a:r>
-            <a:endParaRPr/>
+            <a:endParaRPr dirty="0"/>
           </a:p>
           <a:p>
             <a:pPr marL="800100" lvl="1" indent="-342900" algn="l" rtl="0">
@@ -13890,7 +13965,7 @@
               <a:buAutoNum type="arabicPeriod"/>
             </a:pPr>
             <a:r>
-              <a:rPr lang="en-US" sz="800" b="1">
+              <a:rPr lang="en-US" sz="800" b="1" dirty="0">
                 <a:latin typeface="Verdana"/>
                 <a:ea typeface="Verdana"/>
                 <a:cs typeface="Verdana"/>
@@ -13898,7 +13973,7 @@
               </a:rPr>
               <a:t>Stream API: Stream, primitive streams. Intermediate and Terminal operations.</a:t>
             </a:r>
-            <a:endParaRPr/>
+            <a:endParaRPr dirty="0"/>
           </a:p>
           <a:p>
             <a:pPr marL="800100" lvl="1" indent="-342900" algn="l" rtl="0">
@@ -13919,7 +13994,7 @@
               <a:buAutoNum type="arabicPeriod"/>
             </a:pPr>
             <a:r>
-              <a:rPr lang="en-US" sz="800" b="1">
+              <a:rPr lang="en-US" sz="800" b="1" dirty="0">
                 <a:latin typeface="Verdana"/>
                 <a:ea typeface="Verdana"/>
                 <a:cs typeface="Verdana"/>
@@ -13927,7 +14002,7 @@
               </a:rPr>
               <a:t>Java Streams. Practice. Flat map. Collectors.</a:t>
             </a:r>
-            <a:endParaRPr/>
+            <a:endParaRPr dirty="0"/>
           </a:p>
           <a:p>
             <a:pPr marL="342900" lvl="0" indent="-342900" algn="l" rtl="0">
@@ -13948,7 +14023,7 @@
               <a:buAutoNum type="arabicPeriod" startAt="4"/>
             </a:pPr>
             <a:r>
-              <a:rPr lang="en-US" sz="1200" b="1">
+              <a:rPr lang="en-US" sz="1200" b="1" dirty="0">
                 <a:latin typeface="Verdana"/>
                 <a:ea typeface="Verdana"/>
                 <a:cs typeface="Verdana"/>
@@ -13956,7 +14031,7 @@
               </a:rPr>
               <a:t>Input and Output in Java.</a:t>
             </a:r>
-            <a:endParaRPr sz="800" b="1">
+            <a:endParaRPr sz="800" b="1" dirty="0">
               <a:latin typeface="Verdana"/>
               <a:ea typeface="Verdana"/>
               <a:cs typeface="Verdana"/>
@@ -13982,7 +14057,7 @@
               <a:buAutoNum type="arabicPeriod"/>
             </a:pPr>
             <a:r>
-              <a:rPr lang="en-US" sz="800" b="1">
+              <a:rPr lang="en-US" sz="800" b="1" dirty="0">
                 <a:latin typeface="Verdana"/>
                 <a:ea typeface="Verdana"/>
                 <a:cs typeface="Verdana"/>
@@ -13990,7 +14065,7 @@
               </a:rPr>
               <a:t>Introduction to Input and Output in Java</a:t>
             </a:r>
-            <a:endParaRPr/>
+            <a:endParaRPr dirty="0"/>
           </a:p>
           <a:p>
             <a:pPr marL="800100" lvl="1" indent="-342900" algn="l" rtl="0">
@@ -14011,7 +14086,7 @@
               <a:buAutoNum type="arabicPeriod"/>
             </a:pPr>
             <a:r>
-              <a:rPr lang="en-US" sz="800" b="1">
+              <a:rPr lang="en-US" sz="800" b="1" dirty="0">
                 <a:latin typeface="Verdana"/>
                 <a:ea typeface="Verdana"/>
                 <a:cs typeface="Verdana"/>
@@ -14019,7 +14094,7 @@
               </a:rPr>
               <a:t>Try-catch, Reading/Writing streams of bytes, streams of strings.</a:t>
             </a:r>
-            <a:endParaRPr/>
+            <a:endParaRPr dirty="0"/>
           </a:p>
         </p:txBody>
       </p:sp>
@@ -15124,6 +15199,42 @@
         <p:spPr>
           <a:xfrm flipH="1">
             <a:off x="266212" y="1664208"/>
+            <a:ext cx="529316" cy="0"/>
+          </a:xfrm>
+          <a:prstGeom prst="line">
+            <a:avLst/>
+          </a:prstGeom>
+        </p:spPr>
+        <p:style>
+          <a:lnRef idx="1">
+            <a:schemeClr val="accent6"/>
+          </a:lnRef>
+          <a:fillRef idx="0">
+            <a:schemeClr val="accent6"/>
+          </a:fillRef>
+          <a:effectRef idx="0">
+            <a:schemeClr val="accent6"/>
+          </a:effectRef>
+          <a:fontRef idx="minor">
+            <a:schemeClr val="tx1"/>
+          </a:fontRef>
+        </p:style>
+      </p:cxnSp>
+      <p:cxnSp>
+        <p:nvCxnSpPr>
+          <p:cNvPr id="13" name="Прямая соединительная линия 12">
+            <a:extLst>
+              <a:ext uri="{FF2B5EF4-FFF2-40B4-BE49-F238E27FC236}">
+                <a16:creationId xmlns:a16="http://schemas.microsoft.com/office/drawing/2014/main" id="{639CEACB-ED47-408A-9133-25A58EDFAF58}"/>
+              </a:ext>
+            </a:extLst>
+          </p:cNvPr>
+          <p:cNvCxnSpPr/>
+          <p:nvPr/>
+        </p:nvCxnSpPr>
+        <p:spPr>
+          <a:xfrm flipH="1">
+            <a:off x="260116" y="1844040"/>
             <a:ext cx="529316" cy="0"/>
           </a:xfrm>
           <a:prstGeom prst="line">

</xml_diff>

<commit_message>
10-02-2025 08:56 from PC 'Yevhen Kariev'
</commit_message>
<xml_diff>
--- a/Java Pro/Java Prof Program - new version.pptx
+++ b/Java Pro/Java Prof Program - new version.pptx
@@ -246,7 +246,7 @@
       <p15:sldGuideLst xmlns:p15="http://schemas.microsoft.com/office/powerpoint/2012/main"/>
     </p:ext>
     <p:ext uri="http://customooxmlschemas.google.com/">
-      <go:slidesCustomData xmlns="" xmlns:mc="http://schemas.openxmlformats.org/markup-compatibility/2006" xmlns:mv="urn:schemas-microsoft-com:mac:vml" xmlns:c="http://schemas.openxmlformats.org/drawingml/2006/chart" xmlns:dgm="http://schemas.openxmlformats.org/drawingml/2006/diagram" xmlns:o="urn:schemas-microsoft-com:office:office" xmlns:v="urn:schemas-microsoft-com:vml" xmlns:pvml="urn:schemas-microsoft-com:office:powerpoint" xmlns:com="http://schemas.openxmlformats.org/drawingml/2006/compatibility" xmlns:p14="http://schemas.microsoft.com/office/powerpoint/2010/main" xmlns:p15="http://schemas.microsoft.com/office/powerpoint/2012/main" xmlns:ahyp="http://schemas.microsoft.com/office/drawing/2018/hyperlinkcolor" xmlns:go="http://customooxmlschemas.google.com/" r:id="rId6" roundtripDataSignature="AMtx7mh5ngpk3N/f7XxfAhhMRirGtz3G8w=="/>
+      <go:slidesCustomData xmlns:go="http://customooxmlschemas.google.com/" xmlns:ahyp="http://schemas.microsoft.com/office/drawing/2018/hyperlinkcolor" xmlns:p15="http://schemas.microsoft.com/office/powerpoint/2012/main" xmlns:p14="http://schemas.microsoft.com/office/powerpoint/2010/main" xmlns:com="http://schemas.openxmlformats.org/drawingml/2006/compatibility" xmlns:pvml="urn:schemas-microsoft-com:office:powerpoint" xmlns:v="urn:schemas-microsoft-com:vml" xmlns:o="urn:schemas-microsoft-com:office:office" xmlns:dgm="http://schemas.openxmlformats.org/drawingml/2006/diagram" xmlns:c="http://schemas.openxmlformats.org/drawingml/2006/chart" xmlns:mv="urn:schemas-microsoft-com:mac:vml" xmlns:mc="http://schemas.openxmlformats.org/markup-compatibility/2006" xmlns="" r:id="rId6" roundtripDataSignature="AMtx7mh5ngpk3N/f7XxfAhhMRirGtz3G8w=="/>
     </p:ext>
   </p:extLst>
 </p:presentation>
@@ -15256,6 +15256,42 @@
           </a:fontRef>
         </p:style>
       </p:cxnSp>
+      <p:cxnSp>
+        <p:nvCxnSpPr>
+          <p:cNvPr id="14" name="Прямая соединительная линия 13">
+            <a:extLst>
+              <a:ext uri="{FF2B5EF4-FFF2-40B4-BE49-F238E27FC236}">
+                <a16:creationId xmlns:a16="http://schemas.microsoft.com/office/drawing/2014/main" id="{D22961D1-8F59-4450-A136-BC2915DCC7CD}"/>
+              </a:ext>
+            </a:extLst>
+          </p:cNvPr>
+          <p:cNvCxnSpPr/>
+          <p:nvPr/>
+        </p:nvCxnSpPr>
+        <p:spPr>
+          <a:xfrm flipH="1">
+            <a:off x="260116" y="2325624"/>
+            <a:ext cx="529316" cy="0"/>
+          </a:xfrm>
+          <a:prstGeom prst="line">
+            <a:avLst/>
+          </a:prstGeom>
+        </p:spPr>
+        <p:style>
+          <a:lnRef idx="1">
+            <a:schemeClr val="accent6"/>
+          </a:lnRef>
+          <a:fillRef idx="0">
+            <a:schemeClr val="accent6"/>
+          </a:fillRef>
+          <a:effectRef idx="0">
+            <a:schemeClr val="accent6"/>
+          </a:effectRef>
+          <a:fontRef idx="minor">
+            <a:schemeClr val="tx1"/>
+          </a:fontRef>
+        </p:style>
+      </p:cxnSp>
     </p:spTree>
   </p:cSld>
   <p:clrMapOvr>

</xml_diff>